<commit_message>
added more in utility scales.
</commit_message>
<xml_diff>
--- a/slides/16_decision_making.pptx
+++ b/slides/16_decision_making.pptx
@@ -8667,7 +8667,7 @@
           <a:p>
             <a:fld id="{CDFB1A35-FCF7-4D0C-AE83-400D24256912}" type="datetimeFigureOut">
               <a:rPr lang="en-US" smtClean="0"/>
-              <a:t>11/15/2023</a:t>
+              <a:t>11/19/2023</a:t>
             </a:fld>
             <a:endParaRPr lang="en-US"/>
           </a:p>
@@ -9810,7 +9810,7 @@
           <a:p>
             <a:fld id="{16A8CD98-EF2C-4EFD-A320-0FD1E700AB34}" type="datetimeFigureOut">
               <a:rPr lang="en-US" smtClean="0"/>
-              <a:t>11/15/2023</a:t>
+              <a:t>11/19/2023</a:t>
             </a:fld>
             <a:endParaRPr lang="en-US"/>
           </a:p>
@@ -10008,7 +10008,7 @@
           <a:p>
             <a:fld id="{16A8CD98-EF2C-4EFD-A320-0FD1E700AB34}" type="datetimeFigureOut">
               <a:rPr lang="en-US" smtClean="0"/>
-              <a:t>11/15/2023</a:t>
+              <a:t>11/19/2023</a:t>
             </a:fld>
             <a:endParaRPr lang="en-US"/>
           </a:p>
@@ -10216,7 +10216,7 @@
           <a:p>
             <a:fld id="{16A8CD98-EF2C-4EFD-A320-0FD1E700AB34}" type="datetimeFigureOut">
               <a:rPr lang="en-US" smtClean="0"/>
-              <a:t>11/15/2023</a:t>
+              <a:t>11/19/2023</a:t>
             </a:fld>
             <a:endParaRPr lang="en-US"/>
           </a:p>
@@ -10414,7 +10414,7 @@
           <a:p>
             <a:fld id="{16A8CD98-EF2C-4EFD-A320-0FD1E700AB34}" type="datetimeFigureOut">
               <a:rPr lang="en-US" smtClean="0"/>
-              <a:t>11/15/2023</a:t>
+              <a:t>11/19/2023</a:t>
             </a:fld>
             <a:endParaRPr lang="en-US"/>
           </a:p>
@@ -10689,7 +10689,7 @@
           <a:p>
             <a:fld id="{16A8CD98-EF2C-4EFD-A320-0FD1E700AB34}" type="datetimeFigureOut">
               <a:rPr lang="en-US" smtClean="0"/>
-              <a:t>11/15/2023</a:t>
+              <a:t>11/19/2023</a:t>
             </a:fld>
             <a:endParaRPr lang="en-US"/>
           </a:p>
@@ -10954,7 +10954,7 @@
           <a:p>
             <a:fld id="{16A8CD98-EF2C-4EFD-A320-0FD1E700AB34}" type="datetimeFigureOut">
               <a:rPr lang="en-US" smtClean="0"/>
-              <a:t>11/15/2023</a:t>
+              <a:t>11/19/2023</a:t>
             </a:fld>
             <a:endParaRPr lang="en-US"/>
           </a:p>
@@ -11366,7 +11366,7 @@
           <a:p>
             <a:fld id="{16A8CD98-EF2C-4EFD-A320-0FD1E700AB34}" type="datetimeFigureOut">
               <a:rPr lang="en-US" smtClean="0"/>
-              <a:t>11/15/2023</a:t>
+              <a:t>11/19/2023</a:t>
             </a:fld>
             <a:endParaRPr lang="en-US"/>
           </a:p>
@@ -11507,7 +11507,7 @@
           <a:p>
             <a:fld id="{16A8CD98-EF2C-4EFD-A320-0FD1E700AB34}" type="datetimeFigureOut">
               <a:rPr lang="en-US" smtClean="0"/>
-              <a:t>11/15/2023</a:t>
+              <a:t>11/19/2023</a:t>
             </a:fld>
             <a:endParaRPr lang="en-US"/>
           </a:p>
@@ -11620,7 +11620,7 @@
           <a:p>
             <a:fld id="{16A8CD98-EF2C-4EFD-A320-0FD1E700AB34}" type="datetimeFigureOut">
               <a:rPr lang="en-US" smtClean="0"/>
-              <a:t>11/15/2023</a:t>
+              <a:t>11/19/2023</a:t>
             </a:fld>
             <a:endParaRPr lang="en-US"/>
           </a:p>
@@ -11931,7 +11931,7 @@
           <a:p>
             <a:fld id="{16A8CD98-EF2C-4EFD-A320-0FD1E700AB34}" type="datetimeFigureOut">
               <a:rPr lang="en-US" smtClean="0"/>
-              <a:t>11/15/2023</a:t>
+              <a:t>11/19/2023</a:t>
             </a:fld>
             <a:endParaRPr lang="en-US"/>
           </a:p>
@@ -12219,7 +12219,7 @@
           <a:p>
             <a:fld id="{16A8CD98-EF2C-4EFD-A320-0FD1E700AB34}" type="datetimeFigureOut">
               <a:rPr lang="en-US" smtClean="0"/>
-              <a:t>11/15/2023</a:t>
+              <a:t>11/19/2023</a:t>
             </a:fld>
             <a:endParaRPr lang="en-US"/>
           </a:p>
@@ -12460,7 +12460,7 @@
           <a:p>
             <a:fld id="{16A8CD98-EF2C-4EFD-A320-0FD1E700AB34}" type="datetimeFigureOut">
               <a:rPr lang="en-US" smtClean="0"/>
-              <a:t>11/15/2023</a:t>
+              <a:t>11/19/2023</a:t>
             </a:fld>
             <a:endParaRPr lang="en-US"/>
           </a:p>
@@ -34711,8 +34711,8 @@
           </a:p>
         </p:txBody>
       </p:sp>
-      <mc:AlternateContent xmlns:mc="http://schemas.openxmlformats.org/markup-compatibility/2006" xmlns:a14="http://schemas.microsoft.com/office/drawing/2010/main">
-        <mc:Choice Requires="a14">
+      <mc:AlternateContent xmlns:mc="http://schemas.openxmlformats.org/markup-compatibility/2006">
+        <mc:Choice xmlns:a14="http://schemas.microsoft.com/office/drawing/2010/main" Requires="a14">
           <p:sp>
             <p:nvSpPr>
               <p:cNvPr id="3" name="Content Placeholder 2">
@@ -34800,7 +34800,7 @@
               <a:p>
                 <a:r>
                   <a:rPr lang="en-US" sz="1800" dirty="0"/>
-                  <a:t>Utility functions are derived from rational preferences:</a:t>
+                  <a:t>Utility functions are derived from preferences:</a:t>
                 </a:r>
               </a:p>
               <a:p>
@@ -35036,7 +35036,15 @@
               <a:p>
                 <a:r>
                   <a:rPr lang="en-US" sz="1800" dirty="0"/>
-                  <a:t>Therefore, it is often enough to know the utility </a:t>
+                  <a:t>It is often enough to know a </a:t>
+                </a:r>
+                <a:r>
+                  <a:rPr lang="en-US" sz="1800" b="1" dirty="0"/>
+                  <a:t>ordinal utility function</a:t>
+                </a:r>
+                <a:r>
+                  <a:rPr lang="en-US" sz="1800" dirty="0"/>
+                  <a:t> representing a </a:t>
                 </a:r>
                 <a:r>
                   <a:rPr lang="en-US" sz="1800" b="1" dirty="0"/>
@@ -35044,13 +35052,13 @@
                 </a:r>
                 <a:r>
                   <a:rPr lang="en-US" sz="1800" dirty="0"/>
-                  <a:t> of states.</a:t>
+                  <a:t> of states to make decisions.</a:t>
                 </a:r>
               </a:p>
             </p:txBody>
           </p:sp>
         </mc:Choice>
-        <mc:Fallback xmlns="">
+        <mc:Fallback>
           <p:sp>
             <p:nvSpPr>
               <p:cNvPr id="3" name="Content Placeholder 2">
@@ -35075,7 +35083,7 @@
               <a:blipFill>
                 <a:blip r:embed="rId2"/>
                 <a:stretch>
-                  <a:fillRect l="-842" t="-1603"/>
+                  <a:fillRect l="-842" t="-1603" r="-722"/>
                 </a:stretch>
               </a:blipFill>
             </p:spPr>
@@ -35261,7 +35269,7 @@
           <a:p>
             <a:r>
               <a:rPr lang="en-US" sz="4800" dirty="0"/>
-              <a:t>Expected Utility</a:t>
+              <a:t>Expected Utility of an Action</a:t>
             </a:r>
           </a:p>
         </p:txBody>
@@ -35539,8 +35547,8 @@
           </a:p>
         </p:txBody>
       </p:sp>
-      <mc:AlternateContent xmlns:mc="http://schemas.openxmlformats.org/markup-compatibility/2006" xmlns:a14="http://schemas.microsoft.com/office/drawing/2010/main">
-        <mc:Choice Requires="a14">
+      <mc:AlternateContent xmlns:mc="http://schemas.openxmlformats.org/markup-compatibility/2006">
+        <mc:Choice xmlns:a14="http://schemas.microsoft.com/office/drawing/2010/main" Requires="a14">
           <p:sp>
             <p:nvSpPr>
               <p:cNvPr id="3" name="Content Placeholder 2">
@@ -35565,7 +35573,7 @@
             </p:spPr>
             <p:txBody>
               <a:bodyPr anchor="t">
-                <a:normAutofit/>
+                <a:normAutofit fontScale="92500" lnSpcReduction="10000"/>
               </a:bodyPr>
               <a:lstStyle/>
               <a:p>
@@ -35580,7 +35588,15 @@
               <a:p>
                 <a:r>
                   <a:rPr lang="en-US" sz="1800" dirty="0"/>
-                  <a:t>A utility function </a:t>
+                  <a:t>A </a:t>
+                </a:r>
+                <a:r>
+                  <a:rPr lang="en-US" sz="1800" b="1" dirty="0"/>
+                  <a:t>cardinal utility </a:t>
+                </a:r>
+                <a:r>
+                  <a:rPr lang="en-US" sz="1800" dirty="0"/>
+                  <a:t>function </a:t>
                 </a:r>
                 <a14:m>
                   <m:oMath xmlns:m="http://schemas.openxmlformats.org/officeDocument/2006/math">
@@ -35607,15 +35623,12 @@
                         </m:r>
                       </m:e>
                     </m:d>
-                    <m:r>
-                      <a:rPr lang="en-US" sz="1800">
-                        <a:latin typeface="Cambria Math" panose="02040503050406030204" pitchFamily="18" charset="0"/>
-                      </a:rPr>
-                      <m:t>.</m:t>
-                    </m:r>
                   </m:oMath>
                 </a14:m>
-                <a:endParaRPr lang="en-US" sz="1800" dirty="0"/>
+                <a:r>
+                  <a:rPr lang="en-US" sz="1800" dirty="0"/>
+                  <a:t> where the number represents levels of absolute satisfaction.</a:t>
+                </a:r>
               </a:p>
               <a:p>
                 <a:r>
@@ -35680,203 +35693,312 @@
               <a:p>
                 <a:r>
                   <a:rPr lang="en-US" sz="1800" dirty="0"/>
-                  <a:t>The probability that an action will get us to different states s’</a:t>
+                  <a:t>Transition probabilities </a:t>
                 </a:r>
-                <a:br>
-                  <a:rPr lang="en-US" sz="1800" dirty="0"/>
-                </a:br>
                 <a14:m>
                   <m:oMath xmlns:m="http://schemas.openxmlformats.org/officeDocument/2006/math">
                     <m:r>
-                      <a:rPr lang="en-US" sz="1800" i="1">
+                      <a:rPr lang="en-US" sz="1800" i="1" smtClean="0">
                         <a:latin typeface="Cambria Math" panose="02040503050406030204" pitchFamily="18" charset="0"/>
                       </a:rPr>
                       <m:t>𝑃</m:t>
                     </m:r>
-                    <m:d>
-                      <m:dPr>
+                    <m:r>
+                      <a:rPr lang="en-US" sz="1800" i="1" smtClean="0">
+                        <a:latin typeface="Cambria Math" panose="02040503050406030204" pitchFamily="18" charset="0"/>
+                      </a:rPr>
+                      <m:t>(</m:t>
+                    </m:r>
+                    <m:sSup>
+                      <m:sSupPr>
                         <m:ctrlPr>
                           <a:rPr lang="en-US" sz="1800" i="1">
                             <a:latin typeface="Cambria Math" panose="02040503050406030204" pitchFamily="18" charset="0"/>
                           </a:rPr>
                         </m:ctrlPr>
-                      </m:dPr>
+                      </m:sSupPr>
                       <m:e>
-                        <m:r>
-                          <a:rPr lang="en-US" sz="1800" i="1">
-                            <a:latin typeface="Cambria Math" panose="02040503050406030204" pitchFamily="18" charset="0"/>
-                          </a:rPr>
-                          <m:t>𝑅𝑒𝑠𝑢𝑙𝑡</m:t>
-                        </m:r>
-                        <m:d>
-                          <m:dPr>
-                            <m:ctrlPr>
-                              <a:rPr lang="en-US" sz="1800" i="1">
-                                <a:latin typeface="Cambria Math" panose="02040503050406030204" pitchFamily="18" charset="0"/>
-                              </a:rPr>
-                            </m:ctrlPr>
-                          </m:dPr>
-                          <m:e>
-                            <m:r>
-                              <a:rPr lang="en-US" sz="1800" i="1">
-                                <a:latin typeface="Cambria Math" panose="02040503050406030204" pitchFamily="18" charset="0"/>
-                              </a:rPr>
-                              <m:t>𝑎</m:t>
-                            </m:r>
-                          </m:e>
-                        </m:d>
-                        <m:r>
-                          <a:rPr lang="en-US" sz="1800" i="1">
-                            <a:latin typeface="Cambria Math" panose="02040503050406030204" pitchFamily="18" charset="0"/>
-                          </a:rPr>
-                          <m:t>=</m:t>
-                        </m:r>
-                        <m:sSup>
-                          <m:sSupPr>
-                            <m:ctrlPr>
-                              <a:rPr lang="en-US" sz="1800" i="1">
-                                <a:latin typeface="Cambria Math" panose="02040503050406030204" pitchFamily="18" charset="0"/>
-                              </a:rPr>
-                            </m:ctrlPr>
-                          </m:sSupPr>
-                          <m:e>
-                            <m:r>
-                              <a:rPr lang="en-US" sz="1800" i="1">
-                                <a:latin typeface="Cambria Math" panose="02040503050406030204" pitchFamily="18" charset="0"/>
-                              </a:rPr>
-                              <m:t>𝑠</m:t>
-                            </m:r>
-                          </m:e>
-                          <m:sup>
-                            <m:r>
-                              <a:rPr lang="en-US" sz="1800" i="1">
-                                <a:latin typeface="Cambria Math" panose="02040503050406030204" pitchFamily="18" charset="0"/>
-                              </a:rPr>
-                              <m:t>′</m:t>
-                            </m:r>
-                          </m:sup>
-                        </m:sSup>
-                      </m:e>
-                    </m:d>
-                    <m:r>
-                      <a:rPr lang="en-US" sz="1800" i="1">
-                        <a:latin typeface="Cambria Math" panose="02040503050406030204" pitchFamily="18" charset="0"/>
-                      </a:rPr>
-                      <m:t>=</m:t>
-                    </m:r>
-                    <m:nary>
-                      <m:naryPr>
-                        <m:chr m:val="∑"/>
-                        <m:supHide m:val="on"/>
-                        <m:ctrlPr>
-                          <a:rPr lang="en-US" sz="1800" i="1">
-                            <a:latin typeface="Cambria Math" panose="02040503050406030204" pitchFamily="18" charset="0"/>
-                          </a:rPr>
-                        </m:ctrlPr>
-                      </m:naryPr>
-                      <m:sub>
                         <m:r>
                           <a:rPr lang="en-US" sz="1800" i="1">
                             <a:latin typeface="Cambria Math" panose="02040503050406030204" pitchFamily="18" charset="0"/>
                           </a:rPr>
                           <m:t>𝑠</m:t>
                         </m:r>
-                      </m:sub>
-                      <m:sup/>
-                      <m:e>
+                      </m:e>
+                      <m:sup>
                         <m:r>
                           <a:rPr lang="en-US" sz="1800" i="1">
                             <a:latin typeface="Cambria Math" panose="02040503050406030204" pitchFamily="18" charset="0"/>
                           </a:rPr>
-                          <m:t>𝑃</m:t>
+                          <m:t>′</m:t>
                         </m:r>
-                        <m:d>
-                          <m:dPr>
-                            <m:ctrlPr>
-                              <a:rPr lang="en-US" sz="1800" i="1">
-                                <a:latin typeface="Cambria Math" panose="02040503050406030204" pitchFamily="18" charset="0"/>
-                              </a:rPr>
-                            </m:ctrlPr>
-                          </m:dPr>
-                          <m:e>
-                            <m:r>
-                              <a:rPr lang="en-US" sz="1800" i="1">
-                                <a:latin typeface="Cambria Math" panose="02040503050406030204" pitchFamily="18" charset="0"/>
-                              </a:rPr>
-                              <m:t>𝑠</m:t>
-                            </m:r>
-                          </m:e>
-                        </m:d>
-                        <m:r>
-                          <a:rPr lang="en-US" sz="1800" i="1">
-                            <a:latin typeface="Cambria Math" panose="02040503050406030204" pitchFamily="18" charset="0"/>
-                          </a:rPr>
-                          <m:t>𝑃</m:t>
-                        </m:r>
-                        <m:r>
-                          <a:rPr lang="en-US" sz="1800" i="1">
-                            <a:latin typeface="Cambria Math" panose="02040503050406030204" pitchFamily="18" charset="0"/>
-                          </a:rPr>
-                          <m:t>(</m:t>
-                        </m:r>
-                        <m:sSup>
-                          <m:sSupPr>
-                            <m:ctrlPr>
-                              <a:rPr lang="en-US" sz="1800" i="1">
-                                <a:latin typeface="Cambria Math" panose="02040503050406030204" pitchFamily="18" charset="0"/>
-                              </a:rPr>
-                            </m:ctrlPr>
-                          </m:sSupPr>
-                          <m:e>
-                            <m:r>
-                              <a:rPr lang="en-US" sz="1800" i="1">
-                                <a:latin typeface="Cambria Math" panose="02040503050406030204" pitchFamily="18" charset="0"/>
-                              </a:rPr>
-                              <m:t>𝑠</m:t>
-                            </m:r>
-                          </m:e>
-                          <m:sup>
-                            <m:r>
-                              <a:rPr lang="en-US" sz="1800" i="1">
-                                <a:latin typeface="Cambria Math" panose="02040503050406030204" pitchFamily="18" charset="0"/>
-                              </a:rPr>
-                              <m:t>′</m:t>
-                            </m:r>
-                          </m:sup>
-                        </m:sSup>
-                        <m:r>
-                          <a:rPr lang="en-US" sz="1800" i="1">
-                            <a:latin typeface="Cambria Math" panose="02040503050406030204" pitchFamily="18" charset="0"/>
-                          </a:rPr>
-                          <m:t>|</m:t>
-                        </m:r>
-                        <m:r>
-                          <a:rPr lang="en-US" sz="1800" i="1">
-                            <a:latin typeface="Cambria Math" panose="02040503050406030204" pitchFamily="18" charset="0"/>
-                          </a:rPr>
-                          <m:t>𝑠</m:t>
-                        </m:r>
-                        <m:r>
-                          <a:rPr lang="en-US" sz="1800" i="1">
-                            <a:latin typeface="Cambria Math" panose="02040503050406030204" pitchFamily="18" charset="0"/>
-                          </a:rPr>
-                          <m:t>,</m:t>
-                        </m:r>
-                        <m:r>
-                          <a:rPr lang="en-US" sz="1800" i="1">
-                            <a:latin typeface="Cambria Math" panose="02040503050406030204" pitchFamily="18" charset="0"/>
-                          </a:rPr>
-                          <m:t>𝑎</m:t>
-                        </m:r>
-                        <m:r>
-                          <a:rPr lang="en-US" sz="1800" i="1">
-                            <a:latin typeface="Cambria Math" panose="02040503050406030204" pitchFamily="18" charset="0"/>
-                          </a:rPr>
-                          <m:t>)</m:t>
-                        </m:r>
-                      </m:e>
-                    </m:nary>
+                      </m:sup>
+                    </m:sSup>
+                    <m:r>
+                      <a:rPr lang="en-US" sz="1800" i="1">
+                        <a:latin typeface="Cambria Math" panose="02040503050406030204" pitchFamily="18" charset="0"/>
+                      </a:rPr>
+                      <m:t>|</m:t>
+                    </m:r>
+                    <m:r>
+                      <a:rPr lang="en-US" sz="1800" i="1">
+                        <a:latin typeface="Cambria Math" panose="02040503050406030204" pitchFamily="18" charset="0"/>
+                      </a:rPr>
+                      <m:t>𝑠</m:t>
+                    </m:r>
+                    <m:r>
+                      <a:rPr lang="en-US" sz="1800" i="1">
+                        <a:latin typeface="Cambria Math" panose="02040503050406030204" pitchFamily="18" charset="0"/>
+                      </a:rPr>
+                      <m:t>,</m:t>
+                    </m:r>
+                    <m:r>
+                      <a:rPr lang="en-US" sz="1800" i="1">
+                        <a:latin typeface="Cambria Math" panose="02040503050406030204" pitchFamily="18" charset="0"/>
+                      </a:rPr>
+                      <m:t>𝑎</m:t>
+                    </m:r>
+                    <m:r>
+                      <a:rPr lang="en-US" sz="1800" b="0" i="1" smtClean="0">
+                        <a:latin typeface="Cambria Math" panose="02040503050406030204" pitchFamily="18" charset="0"/>
+                      </a:rPr>
+                      <m:t>)</m:t>
+                    </m:r>
                   </m:oMath>
+                </a14:m>
+                <a:r>
+                  <a:rPr lang="en-US" sz="1800" dirty="0"/>
+                  <a:t>.</a:t>
+                </a:r>
+              </a:p>
+              <a:p>
+                <a:pPr marL="0" indent="0">
+                  <a:buNone/>
+                </a:pPr>
+                <a:endParaRPr lang="en-US" sz="1800" dirty="0"/>
+              </a:p>
+              <a:p>
+                <a:pPr marL="0" indent="0">
+                  <a:buNone/>
+                </a:pPr>
+                <a:r>
+                  <a:rPr lang="en-US" sz="1800" dirty="0"/>
+                  <a:t>The probability that action </a:t>
+                </a:r>
+                <a14:m>
+                  <m:oMath xmlns:m="http://schemas.openxmlformats.org/officeDocument/2006/math">
+                    <m:r>
+                      <a:rPr lang="en-US" sz="1800" i="1" dirty="0" smtClean="0">
+                        <a:latin typeface="Cambria Math" panose="02040503050406030204" pitchFamily="18" charset="0"/>
+                      </a:rPr>
+                      <m:t>𝑎</m:t>
+                    </m:r>
+                  </m:oMath>
+                </a14:m>
+                <a:r>
+                  <a:rPr lang="en-US" sz="1800" dirty="0"/>
+                  <a:t> will get us to state s’</a:t>
+                </a:r>
+                <a:br>
+                  <a:rPr lang="en-US" sz="1800" dirty="0"/>
+                </a:br>
+                <a14:m>
+                  <m:oMathPara xmlns:m="http://schemas.openxmlformats.org/officeDocument/2006/math">
+                    <m:oMathParaPr>
+                      <m:jc m:val="centerGroup"/>
+                    </m:oMathParaPr>
+                    <m:oMath xmlns:m="http://schemas.openxmlformats.org/officeDocument/2006/math">
+                      <m:r>
+                        <a:rPr lang="en-US" sz="1800" i="1">
+                          <a:latin typeface="Cambria Math" panose="02040503050406030204" pitchFamily="18" charset="0"/>
+                        </a:rPr>
+                        <m:t>𝑃</m:t>
+                      </m:r>
+                      <m:d>
+                        <m:dPr>
+                          <m:ctrlPr>
+                            <a:rPr lang="en-US" sz="1800" i="1">
+                              <a:latin typeface="Cambria Math" panose="02040503050406030204" pitchFamily="18" charset="0"/>
+                            </a:rPr>
+                          </m:ctrlPr>
+                        </m:dPr>
+                        <m:e>
+                          <m:r>
+                            <a:rPr lang="en-US" sz="1800" i="1">
+                              <a:latin typeface="Cambria Math" panose="02040503050406030204" pitchFamily="18" charset="0"/>
+                            </a:rPr>
+                            <m:t>𝑅𝑒𝑠𝑢𝑙𝑡</m:t>
+                          </m:r>
+                          <m:d>
+                            <m:dPr>
+                              <m:ctrlPr>
+                                <a:rPr lang="en-US" sz="1800" i="1">
+                                  <a:latin typeface="Cambria Math" panose="02040503050406030204" pitchFamily="18" charset="0"/>
+                                </a:rPr>
+                              </m:ctrlPr>
+                            </m:dPr>
+                            <m:e>
+                              <m:r>
+                                <a:rPr lang="en-US" sz="1800" i="1">
+                                  <a:latin typeface="Cambria Math" panose="02040503050406030204" pitchFamily="18" charset="0"/>
+                                </a:rPr>
+                                <m:t>𝑎</m:t>
+                              </m:r>
+                            </m:e>
+                          </m:d>
+                          <m:r>
+                            <a:rPr lang="en-US" sz="1800" i="1">
+                              <a:latin typeface="Cambria Math" panose="02040503050406030204" pitchFamily="18" charset="0"/>
+                            </a:rPr>
+                            <m:t>=</m:t>
+                          </m:r>
+                          <m:sSup>
+                            <m:sSupPr>
+                              <m:ctrlPr>
+                                <a:rPr lang="en-US" sz="1800" i="1">
+                                  <a:latin typeface="Cambria Math" panose="02040503050406030204" pitchFamily="18" charset="0"/>
+                                </a:rPr>
+                              </m:ctrlPr>
+                            </m:sSupPr>
+                            <m:e>
+                              <m:r>
+                                <a:rPr lang="en-US" sz="1800" i="1">
+                                  <a:latin typeface="Cambria Math" panose="02040503050406030204" pitchFamily="18" charset="0"/>
+                                </a:rPr>
+                                <m:t>𝑠</m:t>
+                              </m:r>
+                            </m:e>
+                            <m:sup>
+                              <m:r>
+                                <a:rPr lang="en-US" sz="1800" i="1">
+                                  <a:latin typeface="Cambria Math" panose="02040503050406030204" pitchFamily="18" charset="0"/>
+                                </a:rPr>
+                                <m:t>′</m:t>
+                              </m:r>
+                            </m:sup>
+                          </m:sSup>
+                        </m:e>
+                      </m:d>
+                      <m:r>
+                        <a:rPr lang="en-US" sz="1800" i="1">
+                          <a:latin typeface="Cambria Math" panose="02040503050406030204" pitchFamily="18" charset="0"/>
+                        </a:rPr>
+                        <m:t>=</m:t>
+                      </m:r>
+                      <m:nary>
+                        <m:naryPr>
+                          <m:chr m:val="∑"/>
+                          <m:supHide m:val="on"/>
+                          <m:ctrlPr>
+                            <a:rPr lang="en-US" sz="1800" i="1">
+                              <a:latin typeface="Cambria Math" panose="02040503050406030204" pitchFamily="18" charset="0"/>
+                            </a:rPr>
+                          </m:ctrlPr>
+                        </m:naryPr>
+                        <m:sub>
+                          <m:r>
+                            <a:rPr lang="en-US" sz="1800" i="1">
+                              <a:latin typeface="Cambria Math" panose="02040503050406030204" pitchFamily="18" charset="0"/>
+                            </a:rPr>
+                            <m:t>𝑠</m:t>
+                          </m:r>
+                        </m:sub>
+                        <m:sup/>
+                        <m:e>
+                          <m:r>
+                            <a:rPr lang="en-US" sz="1800" i="1">
+                              <a:latin typeface="Cambria Math" panose="02040503050406030204" pitchFamily="18" charset="0"/>
+                            </a:rPr>
+                            <m:t>𝑃</m:t>
+                          </m:r>
+                          <m:d>
+                            <m:dPr>
+                              <m:ctrlPr>
+                                <a:rPr lang="en-US" sz="1800" i="1">
+                                  <a:latin typeface="Cambria Math" panose="02040503050406030204" pitchFamily="18" charset="0"/>
+                                </a:rPr>
+                              </m:ctrlPr>
+                            </m:dPr>
+                            <m:e>
+                              <m:r>
+                                <a:rPr lang="en-US" sz="1800" i="1">
+                                  <a:latin typeface="Cambria Math" panose="02040503050406030204" pitchFamily="18" charset="0"/>
+                                </a:rPr>
+                                <m:t>𝑠</m:t>
+                              </m:r>
+                            </m:e>
+                          </m:d>
+                          <m:r>
+                            <a:rPr lang="en-US" sz="1800" i="1">
+                              <a:latin typeface="Cambria Math" panose="02040503050406030204" pitchFamily="18" charset="0"/>
+                            </a:rPr>
+                            <m:t>𝑃</m:t>
+                          </m:r>
+                          <m:r>
+                            <a:rPr lang="en-US" sz="1800" i="1">
+                              <a:latin typeface="Cambria Math" panose="02040503050406030204" pitchFamily="18" charset="0"/>
+                            </a:rPr>
+                            <m:t>(</m:t>
+                          </m:r>
+                          <m:sSup>
+                            <m:sSupPr>
+                              <m:ctrlPr>
+                                <a:rPr lang="en-US" sz="1800" i="1">
+                                  <a:latin typeface="Cambria Math" panose="02040503050406030204" pitchFamily="18" charset="0"/>
+                                </a:rPr>
+                              </m:ctrlPr>
+                            </m:sSupPr>
+                            <m:e>
+                              <m:r>
+                                <a:rPr lang="en-US" sz="1800" i="1">
+                                  <a:latin typeface="Cambria Math" panose="02040503050406030204" pitchFamily="18" charset="0"/>
+                                </a:rPr>
+                                <m:t>𝑠</m:t>
+                              </m:r>
+                            </m:e>
+                            <m:sup>
+                              <m:r>
+                                <a:rPr lang="en-US" sz="1800" i="1">
+                                  <a:latin typeface="Cambria Math" panose="02040503050406030204" pitchFamily="18" charset="0"/>
+                                </a:rPr>
+                                <m:t>′</m:t>
+                              </m:r>
+                            </m:sup>
+                          </m:sSup>
+                          <m:r>
+                            <a:rPr lang="en-US" sz="1800" i="1">
+                              <a:latin typeface="Cambria Math" panose="02040503050406030204" pitchFamily="18" charset="0"/>
+                            </a:rPr>
+                            <m:t>|</m:t>
+                          </m:r>
+                          <m:r>
+                            <a:rPr lang="en-US" sz="1800" i="1">
+                              <a:latin typeface="Cambria Math" panose="02040503050406030204" pitchFamily="18" charset="0"/>
+                            </a:rPr>
+                            <m:t>𝑠</m:t>
+                          </m:r>
+                          <m:r>
+                            <a:rPr lang="en-US" sz="1800" i="1">
+                              <a:latin typeface="Cambria Math" panose="02040503050406030204" pitchFamily="18" charset="0"/>
+                            </a:rPr>
+                            <m:t>,</m:t>
+                          </m:r>
+                          <m:r>
+                            <a:rPr lang="en-US" sz="1800" i="1">
+                              <a:latin typeface="Cambria Math" panose="02040503050406030204" pitchFamily="18" charset="0"/>
+                            </a:rPr>
+                            <m:t>𝑎</m:t>
+                          </m:r>
+                          <m:r>
+                            <a:rPr lang="en-US" sz="1800" i="1">
+                              <a:latin typeface="Cambria Math" panose="02040503050406030204" pitchFamily="18" charset="0"/>
+                            </a:rPr>
+                            <m:t>)</m:t>
+                          </m:r>
+                        </m:e>
+                      </m:nary>
+                    </m:oMath>
+                  </m:oMathPara>
                 </a14:m>
                 <a:endParaRPr lang="en-US" sz="1800" dirty="0"/>
               </a:p>
@@ -35886,7 +36008,21 @@
                 </a:pPr>
                 <a:r>
                   <a:rPr lang="en-US" sz="1800" dirty="0"/>
-                  <a:t>Expected utility of an action:</a:t>
+                  <a:t>The expected utility of action </a:t>
+                </a:r>
+                <a14:m>
+                  <m:oMath xmlns:m="http://schemas.openxmlformats.org/officeDocument/2006/math">
+                    <m:r>
+                      <a:rPr lang="en-US" sz="1800" i="1" dirty="0" smtClean="0">
+                        <a:latin typeface="Cambria Math" panose="02040503050406030204" pitchFamily="18" charset="0"/>
+                      </a:rPr>
+                      <m:t>𝑎</m:t>
+                    </m:r>
+                  </m:oMath>
+                </a14:m>
+                <a:r>
+                  <a:rPr lang="en-US" sz="1800" dirty="0"/>
+                  <a:t> over all possible states is</a:t>
                 </a:r>
                 <a:br>
                   <a:rPr lang="en-US" sz="1800" dirty="0"/>
@@ -36075,7 +36211,7 @@
             </p:txBody>
           </p:sp>
         </mc:Choice>
-        <mc:Fallback xmlns="">
+        <mc:Fallback>
           <p:sp>
             <p:nvSpPr>
               <p:cNvPr id="3" name="Content Placeholder 2">
@@ -36100,7 +36236,7 @@
               <a:blipFill>
                 <a:blip r:embed="rId2"/>
                 <a:stretch>
-                  <a:fillRect l="-1006" t="-1603"/>
+                  <a:fillRect l="-782" t="-1763" b="-3365"/>
                 </a:stretch>
               </a:blipFill>
             </p:spPr>
@@ -36691,8 +36827,8 @@
           </a:p>
         </p:txBody>
       </p:sp>
-      <mc:AlternateContent xmlns:mc="http://schemas.openxmlformats.org/markup-compatibility/2006" xmlns:a14="http://schemas.microsoft.com/office/drawing/2010/main">
-        <mc:Choice Requires="a14">
+      <mc:AlternateContent xmlns:mc="http://schemas.openxmlformats.org/markup-compatibility/2006">
+        <mc:Choice xmlns:a14="http://schemas.microsoft.com/office/drawing/2010/main" Requires="a14">
           <p:sp>
             <p:nvSpPr>
               <p:cNvPr id="3" name="Content Placeholder 2">
@@ -37113,7 +37249,7 @@
                 </a14:m>
                 <a:r>
                   <a:rPr lang="en-US" sz="1600" dirty="0"/>
-                  <a:t> needs a causal model.</a:t>
+                  <a:t> needs a casual model.</a:t>
                 </a:r>
               </a:p>
               <a:p>
@@ -37158,7 +37294,7 @@
             </p:txBody>
           </p:sp>
         </mc:Choice>
-        <mc:Fallback xmlns="">
+        <mc:Fallback>
           <p:sp>
             <p:nvSpPr>
               <p:cNvPr id="3" name="Content Placeholder 2">

</xml_diff>

<commit_message>
added and-or tree slides back.
</commit_message>
<xml_diff>
--- a/slides/16_decision_making.pptx
+++ b/slides/16_decision_making.pptx
@@ -5434,7 +5434,7 @@
           <a:p>
             <a:fld id="{CDFB1A35-FCF7-4D0C-AE83-400D24256912}" type="datetimeFigureOut">
               <a:rPr lang="en-US" smtClean="0"/>
-              <a:t>4/7/2025</a:t>
+              <a:t>4/16/2025</a:t>
             </a:fld>
             <a:endParaRPr lang="en-US"/>
           </a:p>
@@ -5774,8 +5774,8 @@
           <a:lstStyle/>
           <a:p>
             <a:r>
-              <a:rPr lang="en-US">
-                <a:latin typeface="Arial" pitchFamily="34" charset="0"/>
+              <a:rPr lang="en-US" dirty="0">
+                <a:latin typeface="Calibri" panose="020F0502020204030204" pitchFamily="34" charset="0"/>
                 <a:ea typeface="ＭＳ Ｐゴシック" pitchFamily="34" charset="-128"/>
               </a:rPr>
               <a:t>There exists a ghostbusters demo</a:t>
@@ -5928,11 +5928,15 @@
           <a:p>
             <a:pPr eaLnBrk="1" hangingPunct="1"/>
             <a:fld id="{999ECC27-508E-4753-97C7-4AB399A8CBA1}" type="slidenum">
-              <a:rPr lang="en-US" sz="1300"/>
+              <a:rPr lang="en-US" sz="1300">
+                <a:latin typeface="Calibri" panose="020F0502020204030204" pitchFamily="34" charset="0"/>
+              </a:rPr>
               <a:pPr eaLnBrk="1" hangingPunct="1"/>
               <a:t>8</a:t>
             </a:fld>
-            <a:endParaRPr lang="en-US" sz="1300"/>
+            <a:endParaRPr lang="en-US" sz="1300" dirty="0">
+              <a:latin typeface="Calibri" panose="020F0502020204030204" pitchFamily="34" charset="0"/>
+            </a:endParaRPr>
           </a:p>
         </p:txBody>
       </p:sp>
@@ -6017,8 +6021,8 @@
           <a:lstStyle/>
           <a:p>
             <a:r>
-              <a:rPr lang="en-US">
-                <a:latin typeface="Arial" pitchFamily="34" charset="0"/>
+              <a:rPr lang="en-US" dirty="0">
+                <a:latin typeface="Calibri" panose="020F0502020204030204" pitchFamily="34" charset="0"/>
                 <a:ea typeface="ＭＳ Ｐゴシック" pitchFamily="34" charset="-128"/>
               </a:rPr>
               <a:t>There exists a ghostbusters demo</a:t>
@@ -6171,11 +6175,15 @@
           <a:p>
             <a:pPr eaLnBrk="1" hangingPunct="1"/>
             <a:fld id="{999ECC27-508E-4753-97C7-4AB399A8CBA1}" type="slidenum">
-              <a:rPr lang="en-US" sz="1300"/>
+              <a:rPr lang="en-US" sz="1300">
+                <a:latin typeface="Calibri" panose="020F0502020204030204" pitchFamily="34" charset="0"/>
+              </a:rPr>
               <a:pPr eaLnBrk="1" hangingPunct="1"/>
               <a:t>9</a:t>
             </a:fld>
-            <a:endParaRPr lang="en-US" sz="1300"/>
+            <a:endParaRPr lang="en-US" sz="1300" dirty="0">
+              <a:latin typeface="Calibri" panose="020F0502020204030204" pitchFamily="34" charset="0"/>
+            </a:endParaRPr>
           </a:p>
         </p:txBody>
       </p:sp>
@@ -6260,8 +6268,8 @@
           <a:lstStyle/>
           <a:p>
             <a:r>
-              <a:rPr lang="en-US">
-                <a:latin typeface="Arial" pitchFamily="34" charset="0"/>
+              <a:rPr lang="en-US" dirty="0">
+                <a:latin typeface="Calibri" panose="020F0502020204030204" pitchFamily="34" charset="0"/>
                 <a:ea typeface="ＭＳ Ｐゴシック" pitchFamily="34" charset="-128"/>
               </a:rPr>
               <a:t>There exists a ghostbusters demo</a:t>
@@ -6414,11 +6422,15 @@
           <a:p>
             <a:pPr eaLnBrk="1" hangingPunct="1"/>
             <a:fld id="{999ECC27-508E-4753-97C7-4AB399A8CBA1}" type="slidenum">
-              <a:rPr lang="en-US" sz="1300"/>
+              <a:rPr lang="en-US" sz="1300">
+                <a:latin typeface="Calibri" panose="020F0502020204030204" pitchFamily="34" charset="0"/>
+              </a:rPr>
               <a:pPr eaLnBrk="1" hangingPunct="1"/>
               <a:t>10</a:t>
             </a:fld>
-            <a:endParaRPr lang="en-US" sz="1300"/>
+            <a:endParaRPr lang="en-US" sz="1300" dirty="0">
+              <a:latin typeface="Calibri" panose="020F0502020204030204" pitchFamily="34" charset="0"/>
+            </a:endParaRPr>
           </a:p>
         </p:txBody>
       </p:sp>
@@ -6577,7 +6589,7 @@
           <a:p>
             <a:fld id="{16A8CD98-EF2C-4EFD-A320-0FD1E700AB34}" type="datetimeFigureOut">
               <a:rPr lang="en-US" smtClean="0"/>
-              <a:t>4/7/2025</a:t>
+              <a:t>4/16/2025</a:t>
             </a:fld>
             <a:endParaRPr lang="en-US"/>
           </a:p>
@@ -6775,7 +6787,7 @@
           <a:p>
             <a:fld id="{16A8CD98-EF2C-4EFD-A320-0FD1E700AB34}" type="datetimeFigureOut">
               <a:rPr lang="en-US" smtClean="0"/>
-              <a:t>4/7/2025</a:t>
+              <a:t>4/16/2025</a:t>
             </a:fld>
             <a:endParaRPr lang="en-US"/>
           </a:p>
@@ -6983,7 +6995,7 @@
           <a:p>
             <a:fld id="{16A8CD98-EF2C-4EFD-A320-0FD1E700AB34}" type="datetimeFigureOut">
               <a:rPr lang="en-US" smtClean="0"/>
-              <a:t>4/7/2025</a:t>
+              <a:t>4/16/2025</a:t>
             </a:fld>
             <a:endParaRPr lang="en-US"/>
           </a:p>
@@ -7181,7 +7193,7 @@
           <a:p>
             <a:fld id="{16A8CD98-EF2C-4EFD-A320-0FD1E700AB34}" type="datetimeFigureOut">
               <a:rPr lang="en-US" smtClean="0"/>
-              <a:t>4/7/2025</a:t>
+              <a:t>4/16/2025</a:t>
             </a:fld>
             <a:endParaRPr lang="en-US"/>
           </a:p>
@@ -7456,7 +7468,7 @@
           <a:p>
             <a:fld id="{16A8CD98-EF2C-4EFD-A320-0FD1E700AB34}" type="datetimeFigureOut">
               <a:rPr lang="en-US" smtClean="0"/>
-              <a:t>4/7/2025</a:t>
+              <a:t>4/16/2025</a:t>
             </a:fld>
             <a:endParaRPr lang="en-US"/>
           </a:p>
@@ -7721,7 +7733,7 @@
           <a:p>
             <a:fld id="{16A8CD98-EF2C-4EFD-A320-0FD1E700AB34}" type="datetimeFigureOut">
               <a:rPr lang="en-US" smtClean="0"/>
-              <a:t>4/7/2025</a:t>
+              <a:t>4/16/2025</a:t>
             </a:fld>
             <a:endParaRPr lang="en-US"/>
           </a:p>
@@ -8133,7 +8145,7 @@
           <a:p>
             <a:fld id="{16A8CD98-EF2C-4EFD-A320-0FD1E700AB34}" type="datetimeFigureOut">
               <a:rPr lang="en-US" smtClean="0"/>
-              <a:t>4/7/2025</a:t>
+              <a:t>4/16/2025</a:t>
             </a:fld>
             <a:endParaRPr lang="en-US"/>
           </a:p>
@@ -8274,7 +8286,7 @@
           <a:p>
             <a:fld id="{16A8CD98-EF2C-4EFD-A320-0FD1E700AB34}" type="datetimeFigureOut">
               <a:rPr lang="en-US" smtClean="0"/>
-              <a:t>4/7/2025</a:t>
+              <a:t>4/16/2025</a:t>
             </a:fld>
             <a:endParaRPr lang="en-US"/>
           </a:p>
@@ -8387,7 +8399,7 @@
           <a:p>
             <a:fld id="{16A8CD98-EF2C-4EFD-A320-0FD1E700AB34}" type="datetimeFigureOut">
               <a:rPr lang="en-US" smtClean="0"/>
-              <a:t>4/7/2025</a:t>
+              <a:t>4/16/2025</a:t>
             </a:fld>
             <a:endParaRPr lang="en-US"/>
           </a:p>
@@ -8698,7 +8710,7 @@
           <a:p>
             <a:fld id="{16A8CD98-EF2C-4EFD-A320-0FD1E700AB34}" type="datetimeFigureOut">
               <a:rPr lang="en-US" smtClean="0"/>
-              <a:t>4/7/2025</a:t>
+              <a:t>4/16/2025</a:t>
             </a:fld>
             <a:endParaRPr lang="en-US"/>
           </a:p>
@@ -8986,7 +8998,7 @@
           <a:p>
             <a:fld id="{16A8CD98-EF2C-4EFD-A320-0FD1E700AB34}" type="datetimeFigureOut">
               <a:rPr lang="en-US" smtClean="0"/>
-              <a:t>4/7/2025</a:t>
+              <a:t>4/16/2025</a:t>
             </a:fld>
             <a:endParaRPr lang="en-US"/>
           </a:p>
@@ -9227,7 +9239,7 @@
           <a:p>
             <a:fld id="{16A8CD98-EF2C-4EFD-A320-0FD1E700AB34}" type="datetimeFigureOut">
               <a:rPr lang="en-US" smtClean="0"/>
-              <a:t>4/7/2025</a:t>
+              <a:t>4/16/2025</a:t>
             </a:fld>
             <a:endParaRPr lang="en-US"/>
           </a:p>
@@ -9739,7 +9751,7 @@
         </p:blipFill>
         <p:spPr bwMode="auto">
           <a:xfrm>
-            <a:off x="5038282" y="410620"/>
+            <a:off x="4971501" y="410620"/>
             <a:ext cx="7215097" cy="5708138"/>
           </a:xfrm>
           <a:prstGeom prst="rect">
@@ -9898,6 +9910,13 @@
             </a:br>
             <a:r>
               <a:rPr lang="en-US" sz="3600" b="1" dirty="0"/>
+              <a:t>(Decision Networks)</a:t>
+            </a:r>
+            <a:br>
+              <a:rPr lang="en-US" sz="3600" b="1" dirty="0"/>
+            </a:br>
+            <a:r>
+              <a:rPr lang="en-US" sz="3600" b="1" dirty="0"/>
               <a:t>AIMA Chapter 16</a:t>
             </a:r>
           </a:p>
@@ -9943,6 +9962,9 @@
               <a:rPr lang="en-US" sz="1800" dirty="0"/>
               <a:t>Decision network slides by </a:t>
             </a:r>
+            <a:br>
+              <a:rPr lang="en-US" sz="1800" dirty="0"/>
+            </a:br>
             <a:r>
               <a:rPr lang="en-US" sz="1800" kern="1200" dirty="0">
                 <a:solidFill>
@@ -10147,10 +10169,10 @@
         </p:nvGrpSpPr>
         <p:grpSpPr>
           <a:xfrm>
-            <a:off x="10608421" y="5113187"/>
-            <a:ext cx="1218146" cy="1440289"/>
-            <a:chOff x="7151029" y="4191000"/>
-            <a:chExt cx="1688171" cy="1981200"/>
+            <a:off x="10616913" y="5113187"/>
+            <a:ext cx="1209652" cy="1440289"/>
+            <a:chOff x="7162800" y="4191000"/>
+            <a:chExt cx="1676400" cy="1981200"/>
           </a:xfrm>
         </p:grpSpPr>
         <p:sp>
@@ -10248,8 +10270,8 @@
           </p:nvSpPr>
           <p:spPr>
             <a:xfrm>
-              <a:off x="7151029" y="5812970"/>
-              <a:ext cx="1676400" cy="359230"/>
+              <a:off x="7162800" y="5812970"/>
+              <a:ext cx="1664628" cy="359230"/>
             </a:xfrm>
             <a:prstGeom prst="rect">
               <a:avLst/>
@@ -10340,7 +10362,7 @@
                     </a:schemeClr>
                   </a:solidFill>
                   <a:effectLst/>
-                  <a:latin typeface="source sans pro" panose="020B0503030403020204" pitchFamily="34" charset="0"/>
+                  <a:latin typeface="Calibri" panose="020F0502020204030204" pitchFamily="34" charset="0"/>
                 </a:rPr>
                 <a:t>This work is licensed under a </a:t>
               </a:r>
@@ -10352,7 +10374,7 @@
                     </a:schemeClr>
                   </a:solidFill>
                   <a:effectLst/>
-                  <a:latin typeface="source sans pro" panose="020B0503030403020204" pitchFamily="34" charset="0"/>
+                  <a:latin typeface="Calibri" panose="020F0502020204030204" pitchFamily="34" charset="0"/>
                   <a:hlinkClick r:id="rId4">
                     <a:extLst>
                       <a:ext uri="{A12FA001-AC4F-418D-AE19-62706E023703}">
@@ -10371,7 +10393,7 @@
                     </a:schemeClr>
                   </a:solidFill>
                   <a:effectLst/>
-                  <a:latin typeface="source sans pro" panose="020B0503030403020204" pitchFamily="34" charset="0"/>
+                  <a:latin typeface="Calibri" panose="020F0502020204030204" pitchFamily="34" charset="0"/>
                   <a:hlinkClick r:id="rId4">
                     <a:extLst>
                       <a:ext uri="{A12FA001-AC4F-418D-AE19-62706E023703}">
@@ -10390,7 +10412,7 @@
                     </a:schemeClr>
                   </a:solidFill>
                   <a:effectLst/>
-                  <a:latin typeface="source sans pro" panose="020B0503030403020204" pitchFamily="34" charset="0"/>
+                  <a:latin typeface="Calibri" panose="020F0502020204030204" pitchFamily="34" charset="0"/>
                   <a:hlinkClick r:id="rId4">
                     <a:extLst>
                       <a:ext uri="{A12FA001-AC4F-418D-AE19-62706E023703}">
@@ -10409,7 +10431,7 @@
                     </a:schemeClr>
                   </a:solidFill>
                   <a:effectLst/>
-                  <a:latin typeface="source sans pro" panose="020B0503030403020204" pitchFamily="34" charset="0"/>
+                  <a:latin typeface="Calibri" panose="020F0502020204030204" pitchFamily="34" charset="0"/>
                 </a:rPr>
                 <a:t>.</a:t>
               </a:r>
@@ -10745,7 +10767,19 @@
                                   <a:rPr lang="en-US" b="0" dirty="0" smtClean="0">
                                     <a:latin typeface="Cambria Math" panose="02040503050406030204" pitchFamily="18" charset="0"/>
                                   </a:rPr>
-                                  <m:t>0.7</m:t>
+                                  <m:t>0</m:t>
+                                </m:r>
+                                <m:r>
+                                  <a:rPr lang="en-US" b="0" dirty="0" smtClean="0">
+                                    <a:latin typeface="Cambria Math" panose="02040503050406030204" pitchFamily="18" charset="0"/>
+                                  </a:rPr>
+                                  <m:t>.</m:t>
+                                </m:r>
+                                <m:r>
+                                  <a:rPr lang="en-US" b="0" dirty="0" smtClean="0">
+                                    <a:latin typeface="Cambria Math" panose="02040503050406030204" pitchFamily="18" charset="0"/>
+                                  </a:rPr>
+                                  <m:t>7</m:t>
                                 </m:r>
                               </m:oMath>
                             </m:oMathPara>
@@ -10826,7 +10860,19 @@
                                   <a:rPr lang="en-US" b="0" dirty="0" smtClean="0">
                                     <a:latin typeface="Cambria Math" panose="02040503050406030204" pitchFamily="18" charset="0"/>
                                   </a:rPr>
-                                  <m:t>0.3</m:t>
+                                  <m:t>0</m:t>
+                                </m:r>
+                                <m:r>
+                                  <a:rPr lang="en-US" b="0" dirty="0" smtClean="0">
+                                    <a:latin typeface="Cambria Math" panose="02040503050406030204" pitchFamily="18" charset="0"/>
+                                  </a:rPr>
+                                  <m:t>.</m:t>
+                                </m:r>
+                                <m:r>
+                                  <a:rPr lang="en-US" b="0" dirty="0" smtClean="0">
+                                    <a:latin typeface="Cambria Math" panose="02040503050406030204" pitchFamily="18" charset="0"/>
+                                  </a:rPr>
+                                  <m:t>3</m:t>
                                 </m:r>
                               </m:oMath>
                             </m:oMathPara>
@@ -12466,12 +12512,14 @@
                   </m:oMathPara>
                 </a14:m>
                 <a:endParaRPr lang="en-US" sz="2000" dirty="0">
+                  <a:latin typeface="Calibri" panose="020F0502020204030204" pitchFamily="34" charset="0"/>
                   <a:ea typeface="Cambria Math" panose="02040503050406030204" pitchFamily="18" charset="0"/>
                 </a:endParaRPr>
               </a:p>
               <a:p>
                 <a:r>
                   <a:rPr lang="en-US" sz="2000" b="0" dirty="0">
+                    <a:latin typeface="Calibri" panose="020F0502020204030204" pitchFamily="34" charset="0"/>
                     <a:ea typeface="Cambria Math" panose="02040503050406030204" pitchFamily="18" charset="0"/>
                   </a:rPr>
                   <a:t>	       </a:t>
@@ -12483,7 +12531,28 @@
                         <a:latin typeface="Cambria Math" panose="02040503050406030204" pitchFamily="18" charset="0"/>
                         <a:ea typeface="Cambria Math" panose="02040503050406030204" pitchFamily="18" charset="0"/>
                       </a:rPr>
-                      <m:t>   =0.7</m:t>
+                      <m:t>   =</m:t>
+                    </m:r>
+                    <m:r>
+                      <a:rPr lang="en-US" sz="2000" b="0" i="0" smtClean="0">
+                        <a:latin typeface="Cambria Math" panose="02040503050406030204" pitchFamily="18" charset="0"/>
+                        <a:ea typeface="Cambria Math" panose="02040503050406030204" pitchFamily="18" charset="0"/>
+                      </a:rPr>
+                      <m:t>0</m:t>
+                    </m:r>
+                    <m:r>
+                      <a:rPr lang="en-US" sz="2000" b="0" i="0" smtClean="0">
+                        <a:latin typeface="Cambria Math" panose="02040503050406030204" pitchFamily="18" charset="0"/>
+                        <a:ea typeface="Cambria Math" panose="02040503050406030204" pitchFamily="18" charset="0"/>
+                      </a:rPr>
+                      <m:t>.</m:t>
+                    </m:r>
+                    <m:r>
+                      <a:rPr lang="en-US" sz="2000" b="0" i="0" smtClean="0">
+                        <a:latin typeface="Cambria Math" panose="02040503050406030204" pitchFamily="18" charset="0"/>
+                        <a:ea typeface="Cambria Math" panose="02040503050406030204" pitchFamily="18" charset="0"/>
+                      </a:rPr>
+                      <m:t>7</m:t>
                     </m:r>
                     <m:r>
                       <a:rPr lang="en-US" sz="2000" b="0" i="1" smtClean="0">
@@ -12497,18 +12566,69 @@
                         <a:latin typeface="Cambria Math" panose="02040503050406030204" pitchFamily="18" charset="0"/>
                         <a:ea typeface="Cambria Math" panose="02040503050406030204" pitchFamily="18" charset="0"/>
                       </a:rPr>
-                      <m:t>100+0.3</m:t>
+                      <m:t>100</m:t>
+                    </m:r>
+                    <m:r>
+                      <a:rPr lang="en-US" sz="2000" b="0" i="0" smtClean="0">
+                        <a:latin typeface="Cambria Math" panose="02040503050406030204" pitchFamily="18" charset="0"/>
+                        <a:ea typeface="Cambria Math" panose="02040503050406030204" pitchFamily="18" charset="0"/>
+                      </a:rPr>
+                      <m:t>+</m:t>
+                    </m:r>
+                    <m:r>
+                      <a:rPr lang="en-US" sz="2000" b="0" i="0" smtClean="0">
+                        <a:latin typeface="Cambria Math" panose="02040503050406030204" pitchFamily="18" charset="0"/>
+                        <a:ea typeface="Cambria Math" panose="02040503050406030204" pitchFamily="18" charset="0"/>
+                      </a:rPr>
+                      <m:t>0</m:t>
+                    </m:r>
+                    <m:r>
+                      <a:rPr lang="en-US" sz="2000" b="0" i="0" smtClean="0">
+                        <a:latin typeface="Cambria Math" panose="02040503050406030204" pitchFamily="18" charset="0"/>
+                        <a:ea typeface="Cambria Math" panose="02040503050406030204" pitchFamily="18" charset="0"/>
+                      </a:rPr>
+                      <m:t>.</m:t>
+                    </m:r>
+                    <m:r>
+                      <a:rPr lang="en-US" sz="2000" b="0" i="0" smtClean="0">
+                        <a:latin typeface="Cambria Math" panose="02040503050406030204" pitchFamily="18" charset="0"/>
+                        <a:ea typeface="Cambria Math" panose="02040503050406030204" pitchFamily="18" charset="0"/>
+                      </a:rPr>
+                      <m:t>3</m:t>
                     </m:r>
                     <m:r>
                       <a:rPr lang="en-US" sz="2000" b="0" i="1" smtClean="0">
                         <a:latin typeface="Cambria Math" panose="02040503050406030204" pitchFamily="18" charset="0"/>
                         <a:ea typeface="Cambria Math" panose="02040503050406030204" pitchFamily="18" charset="0"/>
                       </a:rPr>
-                      <m:t>∙0=70</m:t>
+                      <m:t>∙</m:t>
+                    </m:r>
+                    <m:r>
+                      <a:rPr lang="en-US" sz="2000" b="0" i="1" smtClean="0">
+                        <a:latin typeface="Cambria Math" panose="02040503050406030204" pitchFamily="18" charset="0"/>
+                        <a:ea typeface="Cambria Math" panose="02040503050406030204" pitchFamily="18" charset="0"/>
+                      </a:rPr>
+                      <m:t>0</m:t>
+                    </m:r>
+                    <m:r>
+                      <a:rPr lang="en-US" sz="2000" b="0" i="1" smtClean="0">
+                        <a:latin typeface="Cambria Math" panose="02040503050406030204" pitchFamily="18" charset="0"/>
+                        <a:ea typeface="Cambria Math" panose="02040503050406030204" pitchFamily="18" charset="0"/>
+                      </a:rPr>
+                      <m:t>=</m:t>
+                    </m:r>
+                    <m:r>
+                      <a:rPr lang="en-US" sz="2000" b="0" i="1" smtClean="0">
+                        <a:latin typeface="Cambria Math" panose="02040503050406030204" pitchFamily="18" charset="0"/>
+                        <a:ea typeface="Cambria Math" panose="02040503050406030204" pitchFamily="18" charset="0"/>
+                      </a:rPr>
+                      <m:t>70</m:t>
                     </m:r>
                   </m:oMath>
                 </a14:m>
-                <a:endParaRPr lang="en-US" sz="2000" dirty="0"/>
+                <a:endParaRPr lang="en-US" sz="2000" dirty="0">
+                  <a:latin typeface="Calibri" panose="020F0502020204030204" pitchFamily="34" charset="0"/>
+                </a:endParaRPr>
               </a:p>
             </p:txBody>
           </p:sp>
@@ -12531,7 +12651,7 @@
                 <a:avLst/>
               </a:prstGeom>
               <a:blipFill>
-                <a:blip r:embed="rId4"/>
+                <a:blip r:embed="rId9"/>
                 <a:stretch>
                   <a:fillRect l="-1047" t="-2575"/>
                 </a:stretch>
@@ -12871,12 +12991,14 @@
                   </m:oMathPara>
                 </a14:m>
                 <a:endParaRPr lang="en-US" sz="2000" dirty="0">
+                  <a:latin typeface="Calibri" panose="020F0502020204030204" pitchFamily="34" charset="0"/>
                   <a:ea typeface="Cambria Math" panose="02040503050406030204" pitchFamily="18" charset="0"/>
                 </a:endParaRPr>
               </a:p>
               <a:p>
                 <a:r>
                   <a:rPr lang="en-US" sz="2000" b="0" dirty="0">
+                    <a:latin typeface="Calibri" panose="020F0502020204030204" pitchFamily="34" charset="0"/>
                     <a:ea typeface="Cambria Math" panose="02040503050406030204" pitchFamily="18" charset="0"/>
                   </a:rPr>
                   <a:t>	       </a:t>
@@ -12888,7 +13010,28 @@
                         <a:latin typeface="Cambria Math" panose="02040503050406030204" pitchFamily="18" charset="0"/>
                         <a:ea typeface="Cambria Math" panose="02040503050406030204" pitchFamily="18" charset="0"/>
                       </a:rPr>
-                      <m:t>   =0.7</m:t>
+                      <m:t>   =</m:t>
+                    </m:r>
+                    <m:r>
+                      <a:rPr lang="en-US" sz="2000" b="0" i="0" smtClean="0">
+                        <a:latin typeface="Cambria Math" panose="02040503050406030204" pitchFamily="18" charset="0"/>
+                        <a:ea typeface="Cambria Math" panose="02040503050406030204" pitchFamily="18" charset="0"/>
+                      </a:rPr>
+                      <m:t>0</m:t>
+                    </m:r>
+                    <m:r>
+                      <a:rPr lang="en-US" sz="2000" b="0" i="0" smtClean="0">
+                        <a:latin typeface="Cambria Math" panose="02040503050406030204" pitchFamily="18" charset="0"/>
+                        <a:ea typeface="Cambria Math" panose="02040503050406030204" pitchFamily="18" charset="0"/>
+                      </a:rPr>
+                      <m:t>.</m:t>
+                    </m:r>
+                    <m:r>
+                      <a:rPr lang="en-US" sz="2000" b="0" i="0" smtClean="0">
+                        <a:latin typeface="Cambria Math" panose="02040503050406030204" pitchFamily="18" charset="0"/>
+                        <a:ea typeface="Cambria Math" panose="02040503050406030204" pitchFamily="18" charset="0"/>
+                      </a:rPr>
+                      <m:t>7</m:t>
                     </m:r>
                     <m:r>
                       <a:rPr lang="en-US" sz="2000" b="0" i="1" smtClean="0">
@@ -12902,18 +13045,69 @@
                         <a:latin typeface="Cambria Math" panose="02040503050406030204" pitchFamily="18" charset="0"/>
                         <a:ea typeface="Cambria Math" panose="02040503050406030204" pitchFamily="18" charset="0"/>
                       </a:rPr>
-                      <m:t>20+0.3</m:t>
+                      <m:t>20</m:t>
+                    </m:r>
+                    <m:r>
+                      <a:rPr lang="en-US" sz="2000" b="0" i="0" smtClean="0">
+                        <a:latin typeface="Cambria Math" panose="02040503050406030204" pitchFamily="18" charset="0"/>
+                        <a:ea typeface="Cambria Math" panose="02040503050406030204" pitchFamily="18" charset="0"/>
+                      </a:rPr>
+                      <m:t>+</m:t>
+                    </m:r>
+                    <m:r>
+                      <a:rPr lang="en-US" sz="2000" b="0" i="0" smtClean="0">
+                        <a:latin typeface="Cambria Math" panose="02040503050406030204" pitchFamily="18" charset="0"/>
+                        <a:ea typeface="Cambria Math" panose="02040503050406030204" pitchFamily="18" charset="0"/>
+                      </a:rPr>
+                      <m:t>0</m:t>
+                    </m:r>
+                    <m:r>
+                      <a:rPr lang="en-US" sz="2000" b="0" i="0" smtClean="0">
+                        <a:latin typeface="Cambria Math" panose="02040503050406030204" pitchFamily="18" charset="0"/>
+                        <a:ea typeface="Cambria Math" panose="02040503050406030204" pitchFamily="18" charset="0"/>
+                      </a:rPr>
+                      <m:t>.</m:t>
+                    </m:r>
+                    <m:r>
+                      <a:rPr lang="en-US" sz="2000" b="0" i="0" smtClean="0">
+                        <a:latin typeface="Cambria Math" panose="02040503050406030204" pitchFamily="18" charset="0"/>
+                        <a:ea typeface="Cambria Math" panose="02040503050406030204" pitchFamily="18" charset="0"/>
+                      </a:rPr>
+                      <m:t>3</m:t>
                     </m:r>
                     <m:r>
                       <a:rPr lang="en-US" sz="2000" b="0" i="1" smtClean="0">
                         <a:latin typeface="Cambria Math" panose="02040503050406030204" pitchFamily="18" charset="0"/>
                         <a:ea typeface="Cambria Math" panose="02040503050406030204" pitchFamily="18" charset="0"/>
                       </a:rPr>
-                      <m:t>∙70=35</m:t>
+                      <m:t>∙</m:t>
+                    </m:r>
+                    <m:r>
+                      <a:rPr lang="en-US" sz="2000" b="0" i="1" smtClean="0">
+                        <a:latin typeface="Cambria Math" panose="02040503050406030204" pitchFamily="18" charset="0"/>
+                        <a:ea typeface="Cambria Math" panose="02040503050406030204" pitchFamily="18" charset="0"/>
+                      </a:rPr>
+                      <m:t>70</m:t>
+                    </m:r>
+                    <m:r>
+                      <a:rPr lang="en-US" sz="2000" b="0" i="1" smtClean="0">
+                        <a:latin typeface="Cambria Math" panose="02040503050406030204" pitchFamily="18" charset="0"/>
+                        <a:ea typeface="Cambria Math" panose="02040503050406030204" pitchFamily="18" charset="0"/>
+                      </a:rPr>
+                      <m:t>=</m:t>
+                    </m:r>
+                    <m:r>
+                      <a:rPr lang="en-US" sz="2000" b="0" i="1" smtClean="0">
+                        <a:latin typeface="Cambria Math" panose="02040503050406030204" pitchFamily="18" charset="0"/>
+                        <a:ea typeface="Cambria Math" panose="02040503050406030204" pitchFamily="18" charset="0"/>
+                      </a:rPr>
+                      <m:t>35</m:t>
                     </m:r>
                   </m:oMath>
                 </a14:m>
-                <a:endParaRPr lang="en-US" sz="2000" dirty="0"/>
+                <a:endParaRPr lang="en-US" sz="2000" dirty="0">
+                  <a:latin typeface="Calibri" panose="020F0502020204030204" pitchFamily="34" charset="0"/>
+                </a:endParaRPr>
               </a:p>
               <a:p>
                 <a:pPr eaLnBrk="1" hangingPunct="1">
@@ -12947,7 +13141,7 @@
                 <a:avLst/>
               </a:prstGeom>
               <a:blipFill>
-                <a:blip r:embed="rId5"/>
+                <a:blip r:embed="rId10"/>
                 <a:stretch>
                   <a:fillRect l="-1067" t="-1993"/>
                 </a:stretch>
@@ -13326,7 +13520,15 @@
                           <a:ea typeface="Cambria Math" panose="02040503050406030204" pitchFamily="18" charset="0"/>
                           <a:cs typeface="Calibri"/>
                         </a:rPr>
-                        <m:t>=70</m:t>
+                        <m:t>=</m:t>
+                      </m:r>
+                      <m:r>
+                        <a:rPr lang="en-US" sz="1800" b="0" i="0" smtClean="0">
+                          <a:latin typeface="Cambria Math" panose="02040503050406030204" pitchFamily="18" charset="0"/>
+                          <a:ea typeface="Cambria Math" panose="02040503050406030204" pitchFamily="18" charset="0"/>
+                          <a:cs typeface="Calibri"/>
+                        </a:rPr>
+                        <m:t>70</m:t>
                       </m:r>
                     </m:oMath>
                   </m:oMathPara>
@@ -13415,7 +13617,7 @@
           <p:nvPr/>
         </p:nvPicPr>
         <p:blipFill>
-          <a:blip r:embed="rId9" cstate="print">
+          <a:blip r:embed="rId11" cstate="print">
             <a:extLst>
               <a:ext uri="{28A0092B-C50C-407E-A947-70E740481C1C}">
                 <a14:useLocalDpi xmlns:a14="http://schemas.microsoft.com/office/drawing/2010/main" val="0"/>
@@ -13454,7 +13656,7 @@
           <p:nvPr/>
         </p:nvPicPr>
         <p:blipFill>
-          <a:blip r:embed="rId10">
+          <a:blip r:embed="rId12">
             <a:extLst>
               <a:ext uri="{28A0092B-C50C-407E-A947-70E740481C1C}">
                 <a14:useLocalDpi xmlns:a14="http://schemas.microsoft.com/office/drawing/2010/main" val="0"/>
@@ -13953,7 +14155,7 @@
 </file>
 
 <file path=ppt/slides/slide11.xml><?xml version="1.0" encoding="utf-8"?>
-<p:sld xmlns:a="http://schemas.openxmlformats.org/drawingml/2006/main" xmlns:r="http://schemas.openxmlformats.org/officeDocument/2006/relationships" xmlns:p="http://schemas.openxmlformats.org/presentationml/2006/main" show="0">
+<p:sld xmlns:a="http://schemas.openxmlformats.org/drawingml/2006/main" xmlns:r="http://schemas.openxmlformats.org/officeDocument/2006/relationships" xmlns:p="http://schemas.openxmlformats.org/presentationml/2006/main">
   <p:cSld>
     <p:spTree>
       <p:nvGrpSpPr>
@@ -17337,6 +17539,56 @@
           </a:prstGeom>
         </p:spPr>
       </p:pic>
+      <p:sp>
+        <p:nvSpPr>
+          <p:cNvPr id="11" name="TextBox 10">
+            <a:extLst>
+              <a:ext uri="{FF2B5EF4-FFF2-40B4-BE49-F238E27FC236}">
+                <a16:creationId xmlns:a16="http://schemas.microsoft.com/office/drawing/2014/main" id="{162BD2C4-1E03-54F9-03D5-F868CE0401F9}"/>
+              </a:ext>
+            </a:extLst>
+          </p:cNvPr>
+          <p:cNvSpPr txBox="1"/>
+          <p:nvPr/>
+        </p:nvSpPr>
+        <p:spPr>
+          <a:xfrm>
+            <a:off x="5757775" y="5987534"/>
+            <a:ext cx="3305441" cy="369332"/>
+          </a:xfrm>
+          <a:prstGeom prst="rect">
+            <a:avLst/>
+          </a:prstGeom>
+        </p:spPr>
+        <p:style>
+          <a:lnRef idx="2">
+            <a:schemeClr val="accent2">
+              <a:shade val="15000"/>
+            </a:schemeClr>
+          </a:lnRef>
+          <a:fillRef idx="1">
+            <a:schemeClr val="accent2"/>
+          </a:fillRef>
+          <a:effectRef idx="0">
+            <a:schemeClr val="accent2"/>
+          </a:effectRef>
+          <a:fontRef idx="minor">
+            <a:schemeClr val="lt1"/>
+          </a:fontRef>
+        </p:style>
+        <p:txBody>
+          <a:bodyPr wrap="square" rtlCol="0">
+            <a:spAutoFit/>
+          </a:bodyPr>
+          <a:lstStyle/>
+          <a:p>
+            <a:r>
+              <a:rPr lang="en-US" dirty="0"/>
+              <a:t>This is similar to an AND-OR tree!</a:t>
+            </a:r>
+          </a:p>
+        </p:txBody>
+      </p:sp>
     </p:spTree>
   </p:cSld>
   <p:clrMapOvr>
@@ -19425,7 +19677,19 @@
                                   <a:rPr lang="en-US" b="0" dirty="0" smtClean="0">
                                     <a:latin typeface="Cambria Math" panose="02040503050406030204" pitchFamily="18" charset="0"/>
                                   </a:rPr>
-                                  <m:t>0.7</m:t>
+                                  <m:t>0</m:t>
+                                </m:r>
+                                <m:r>
+                                  <a:rPr lang="en-US" b="0" dirty="0" smtClean="0">
+                                    <a:latin typeface="Cambria Math" panose="02040503050406030204" pitchFamily="18" charset="0"/>
+                                  </a:rPr>
+                                  <m:t>.</m:t>
+                                </m:r>
+                                <m:r>
+                                  <a:rPr lang="en-US" b="0" dirty="0" smtClean="0">
+                                    <a:latin typeface="Cambria Math" panose="02040503050406030204" pitchFamily="18" charset="0"/>
+                                  </a:rPr>
+                                  <m:t>7</m:t>
                                 </m:r>
                               </m:oMath>
                             </m:oMathPara>
@@ -19506,7 +19770,19 @@
                                   <a:rPr lang="en-US" b="0" dirty="0" smtClean="0">
                                     <a:latin typeface="Cambria Math" panose="02040503050406030204" pitchFamily="18" charset="0"/>
                                   </a:rPr>
-                                  <m:t>0.3</m:t>
+                                  <m:t>0</m:t>
+                                </m:r>
+                                <m:r>
+                                  <a:rPr lang="en-US" b="0" dirty="0" smtClean="0">
+                                    <a:latin typeface="Cambria Math" panose="02040503050406030204" pitchFamily="18" charset="0"/>
+                                  </a:rPr>
+                                  <m:t>.</m:t>
+                                </m:r>
+                                <m:r>
+                                  <a:rPr lang="en-US" b="0" dirty="0" smtClean="0">
+                                    <a:latin typeface="Cambria Math" panose="02040503050406030204" pitchFamily="18" charset="0"/>
+                                  </a:rPr>
+                                  <m:t>3</m:t>
                                 </m:r>
                               </m:oMath>
                             </m:oMathPara>
@@ -19973,7 +20249,19 @@
                                   <a:rPr lang="en-US" b="0" dirty="0" smtClean="0">
                                     <a:latin typeface="Cambria Math" panose="02040503050406030204" pitchFamily="18" charset="0"/>
                                   </a:rPr>
-                                  <m:t>0.34</m:t>
+                                  <m:t>0</m:t>
+                                </m:r>
+                                <m:r>
+                                  <a:rPr lang="en-US" b="0" dirty="0" smtClean="0">
+                                    <a:latin typeface="Cambria Math" panose="02040503050406030204" pitchFamily="18" charset="0"/>
+                                  </a:rPr>
+                                  <m:t>.</m:t>
+                                </m:r>
+                                <m:r>
+                                  <a:rPr lang="en-US" b="0" dirty="0" smtClean="0">
+                                    <a:latin typeface="Cambria Math" panose="02040503050406030204" pitchFamily="18" charset="0"/>
+                                  </a:rPr>
+                                  <m:t>34</m:t>
                                 </m:r>
                               </m:oMath>
                             </m:oMathPara>
@@ -20054,7 +20342,19 @@
                                   <a:rPr lang="en-US" b="0" dirty="0" smtClean="0">
                                     <a:latin typeface="Cambria Math" panose="02040503050406030204" pitchFamily="18" charset="0"/>
                                   </a:rPr>
-                                  <m:t>0.66</m:t>
+                                  <m:t>0</m:t>
+                                </m:r>
+                                <m:r>
+                                  <a:rPr lang="en-US" b="0" dirty="0" smtClean="0">
+                                    <a:latin typeface="Cambria Math" panose="02040503050406030204" pitchFamily="18" charset="0"/>
+                                  </a:rPr>
+                                  <m:t>.</m:t>
+                                </m:r>
+                                <m:r>
+                                  <a:rPr lang="en-US" b="0" dirty="0" smtClean="0">
+                                    <a:latin typeface="Cambria Math" panose="02040503050406030204" pitchFamily="18" charset="0"/>
+                                  </a:rPr>
+                                  <m:t>66</m:t>
                                 </m:r>
                               </m:oMath>
                             </m:oMathPara>
@@ -20655,12 +20955,14 @@
                   </m:oMathPara>
                 </a14:m>
                 <a:endParaRPr lang="en-US" sz="2000" dirty="0">
+                  <a:latin typeface="Calibri" panose="020F0502020204030204" pitchFamily="34" charset="0"/>
                   <a:ea typeface="Cambria Math" panose="02040503050406030204" pitchFamily="18" charset="0"/>
                 </a:endParaRPr>
               </a:p>
               <a:p>
                 <a:r>
                   <a:rPr lang="en-US" sz="2000" b="0" dirty="0">
+                    <a:latin typeface="Calibri" panose="020F0502020204030204" pitchFamily="34" charset="0"/>
                     <a:ea typeface="Cambria Math" panose="02040503050406030204" pitchFamily="18" charset="0"/>
                   </a:rPr>
                   <a:t>	       </a:t>
@@ -20672,32 +20974,104 @@
                         <a:latin typeface="Cambria Math" panose="02040503050406030204" pitchFamily="18" charset="0"/>
                         <a:ea typeface="Cambria Math" panose="02040503050406030204" pitchFamily="18" charset="0"/>
                       </a:rPr>
-                      <m:t>   =0.</m:t>
+                      <m:t>   =</m:t>
+                    </m:r>
+                    <m:r>
+                      <a:rPr lang="en-US" sz="2000" b="0" i="0" smtClean="0">
+                        <a:latin typeface="Cambria Math" panose="02040503050406030204" pitchFamily="18" charset="0"/>
+                        <a:ea typeface="Cambria Math" panose="02040503050406030204" pitchFamily="18" charset="0"/>
+                      </a:rPr>
+                      <m:t>0</m:t>
+                    </m:r>
+                    <m:r>
+                      <a:rPr lang="en-US" sz="2000" b="0" i="0" smtClean="0">
+                        <a:latin typeface="Cambria Math" panose="02040503050406030204" pitchFamily="18" charset="0"/>
+                        <a:ea typeface="Cambria Math" panose="02040503050406030204" pitchFamily="18" charset="0"/>
+                      </a:rPr>
+                      <m:t>.</m:t>
                     </m:r>
                     <m:r>
                       <a:rPr lang="en-US" sz="2000" b="0" i="1" smtClean="0">
                         <a:latin typeface="Cambria Math" panose="02040503050406030204" pitchFamily="18" charset="0"/>
                         <a:ea typeface="Cambria Math" panose="02040503050406030204" pitchFamily="18" charset="0"/>
                       </a:rPr>
-                      <m:t>34∙</m:t>
+                      <m:t>34</m:t>
+                    </m:r>
+                    <m:r>
+                      <a:rPr lang="en-US" sz="2000" b="0" i="1" smtClean="0">
+                        <a:latin typeface="Cambria Math" panose="02040503050406030204" pitchFamily="18" charset="0"/>
+                        <a:ea typeface="Cambria Math" panose="02040503050406030204" pitchFamily="18" charset="0"/>
+                      </a:rPr>
+                      <m:t>∙</m:t>
                     </m:r>
                     <m:r>
                       <a:rPr lang="en-US" sz="2000" b="0" i="0" smtClean="0">
                         <a:latin typeface="Cambria Math" panose="02040503050406030204" pitchFamily="18" charset="0"/>
                         <a:ea typeface="Cambria Math" panose="02040503050406030204" pitchFamily="18" charset="0"/>
                       </a:rPr>
-                      <m:t>100+0.</m:t>
+                      <m:t>100</m:t>
+                    </m:r>
+                    <m:r>
+                      <a:rPr lang="en-US" sz="2000" b="0" i="0" smtClean="0">
+                        <a:latin typeface="Cambria Math" panose="02040503050406030204" pitchFamily="18" charset="0"/>
+                        <a:ea typeface="Cambria Math" panose="02040503050406030204" pitchFamily="18" charset="0"/>
+                      </a:rPr>
+                      <m:t>+</m:t>
+                    </m:r>
+                    <m:r>
+                      <a:rPr lang="en-US" sz="2000" b="0" i="0" smtClean="0">
+                        <a:latin typeface="Cambria Math" panose="02040503050406030204" pitchFamily="18" charset="0"/>
+                        <a:ea typeface="Cambria Math" panose="02040503050406030204" pitchFamily="18" charset="0"/>
+                      </a:rPr>
+                      <m:t>0</m:t>
+                    </m:r>
+                    <m:r>
+                      <a:rPr lang="en-US" sz="2000" b="0" i="0" smtClean="0">
+                        <a:latin typeface="Cambria Math" panose="02040503050406030204" pitchFamily="18" charset="0"/>
+                        <a:ea typeface="Cambria Math" panose="02040503050406030204" pitchFamily="18" charset="0"/>
+                      </a:rPr>
+                      <m:t>.</m:t>
                     </m:r>
                     <m:r>
                       <a:rPr lang="en-US" sz="2000" b="0" i="1" smtClean="0">
                         <a:latin typeface="Cambria Math" panose="02040503050406030204" pitchFamily="18" charset="0"/>
                         <a:ea typeface="Cambria Math" panose="02040503050406030204" pitchFamily="18" charset="0"/>
                       </a:rPr>
-                      <m:t>66∙0=34</m:t>
+                      <m:t>66</m:t>
+                    </m:r>
+                    <m:r>
+                      <a:rPr lang="en-US" sz="2000" b="0" i="1" smtClean="0">
+                        <a:latin typeface="Cambria Math" panose="02040503050406030204" pitchFamily="18" charset="0"/>
+                        <a:ea typeface="Cambria Math" panose="02040503050406030204" pitchFamily="18" charset="0"/>
+                      </a:rPr>
+                      <m:t>∙</m:t>
+                    </m:r>
+                    <m:r>
+                      <a:rPr lang="en-US" sz="2000" b="0" i="1" smtClean="0">
+                        <a:latin typeface="Cambria Math" panose="02040503050406030204" pitchFamily="18" charset="0"/>
+                        <a:ea typeface="Cambria Math" panose="02040503050406030204" pitchFamily="18" charset="0"/>
+                      </a:rPr>
+                      <m:t>0</m:t>
+                    </m:r>
+                    <m:r>
+                      <a:rPr lang="en-US" sz="2000" b="0" i="1" smtClean="0">
+                        <a:latin typeface="Cambria Math" panose="02040503050406030204" pitchFamily="18" charset="0"/>
+                        <a:ea typeface="Cambria Math" panose="02040503050406030204" pitchFamily="18" charset="0"/>
+                      </a:rPr>
+                      <m:t>=</m:t>
+                    </m:r>
+                    <m:r>
+                      <a:rPr lang="en-US" sz="2000" b="0" i="1" smtClean="0">
+                        <a:latin typeface="Cambria Math" panose="02040503050406030204" pitchFamily="18" charset="0"/>
+                        <a:ea typeface="Cambria Math" panose="02040503050406030204" pitchFamily="18" charset="0"/>
+                      </a:rPr>
+                      <m:t>34</m:t>
                     </m:r>
                   </m:oMath>
                 </a14:m>
-                <a:endParaRPr lang="en-US" sz="2000" dirty="0"/>
+                <a:endParaRPr lang="en-US" sz="2000" dirty="0">
+                  <a:latin typeface="Calibri" panose="020F0502020204030204" pitchFamily="34" charset="0"/>
+                </a:endParaRPr>
               </a:p>
             </p:txBody>
           </p:sp>
@@ -21102,12 +21476,14 @@
                   </m:oMathPara>
                 </a14:m>
                 <a:endParaRPr lang="en-US" sz="2000" dirty="0">
+                  <a:latin typeface="Calibri" panose="020F0502020204030204" pitchFamily="34" charset="0"/>
                   <a:ea typeface="Cambria Math" panose="02040503050406030204" pitchFamily="18" charset="0"/>
                 </a:endParaRPr>
               </a:p>
               <a:p>
                 <a:r>
                   <a:rPr lang="en-US" sz="2000" b="0" dirty="0">
+                    <a:latin typeface="Calibri" panose="020F0502020204030204" pitchFamily="34" charset="0"/>
                     <a:ea typeface="Cambria Math" panose="02040503050406030204" pitchFamily="18" charset="0"/>
                   </a:rPr>
                   <a:t>	       </a:t>
@@ -21119,32 +21495,104 @@
                         <a:latin typeface="Cambria Math" panose="02040503050406030204" pitchFamily="18" charset="0"/>
                         <a:ea typeface="Cambria Math" panose="02040503050406030204" pitchFamily="18" charset="0"/>
                       </a:rPr>
-                      <m:t>   =0.</m:t>
+                      <m:t>   =</m:t>
+                    </m:r>
+                    <m:r>
+                      <a:rPr lang="en-US" sz="2000" b="0" i="0" smtClean="0">
+                        <a:latin typeface="Cambria Math" panose="02040503050406030204" pitchFamily="18" charset="0"/>
+                        <a:ea typeface="Cambria Math" panose="02040503050406030204" pitchFamily="18" charset="0"/>
+                      </a:rPr>
+                      <m:t>0</m:t>
+                    </m:r>
+                    <m:r>
+                      <a:rPr lang="en-US" sz="2000" b="0" i="0" smtClean="0">
+                        <a:latin typeface="Cambria Math" panose="02040503050406030204" pitchFamily="18" charset="0"/>
+                        <a:ea typeface="Cambria Math" panose="02040503050406030204" pitchFamily="18" charset="0"/>
+                      </a:rPr>
+                      <m:t>.</m:t>
                     </m:r>
                     <m:r>
                       <a:rPr lang="en-US" sz="2000" b="0" i="1" smtClean="0">
                         <a:latin typeface="Cambria Math" panose="02040503050406030204" pitchFamily="18" charset="0"/>
                         <a:ea typeface="Cambria Math" panose="02040503050406030204" pitchFamily="18" charset="0"/>
                       </a:rPr>
-                      <m:t>34∙</m:t>
+                      <m:t>34</m:t>
+                    </m:r>
+                    <m:r>
+                      <a:rPr lang="en-US" sz="2000" b="0" i="1" smtClean="0">
+                        <a:latin typeface="Cambria Math" panose="02040503050406030204" pitchFamily="18" charset="0"/>
+                        <a:ea typeface="Cambria Math" panose="02040503050406030204" pitchFamily="18" charset="0"/>
+                      </a:rPr>
+                      <m:t>∙</m:t>
                     </m:r>
                     <m:r>
                       <a:rPr lang="en-US" sz="2000" b="0" i="0" smtClean="0">
                         <a:latin typeface="Cambria Math" panose="02040503050406030204" pitchFamily="18" charset="0"/>
                         <a:ea typeface="Cambria Math" panose="02040503050406030204" pitchFamily="18" charset="0"/>
                       </a:rPr>
-                      <m:t>20+0.</m:t>
+                      <m:t>20</m:t>
+                    </m:r>
+                    <m:r>
+                      <a:rPr lang="en-US" sz="2000" b="0" i="0" smtClean="0">
+                        <a:latin typeface="Cambria Math" panose="02040503050406030204" pitchFamily="18" charset="0"/>
+                        <a:ea typeface="Cambria Math" panose="02040503050406030204" pitchFamily="18" charset="0"/>
+                      </a:rPr>
+                      <m:t>+</m:t>
+                    </m:r>
+                    <m:r>
+                      <a:rPr lang="en-US" sz="2000" b="0" i="0" smtClean="0">
+                        <a:latin typeface="Cambria Math" panose="02040503050406030204" pitchFamily="18" charset="0"/>
+                        <a:ea typeface="Cambria Math" panose="02040503050406030204" pitchFamily="18" charset="0"/>
+                      </a:rPr>
+                      <m:t>0</m:t>
+                    </m:r>
+                    <m:r>
+                      <a:rPr lang="en-US" sz="2000" b="0" i="0" smtClean="0">
+                        <a:latin typeface="Cambria Math" panose="02040503050406030204" pitchFamily="18" charset="0"/>
+                        <a:ea typeface="Cambria Math" panose="02040503050406030204" pitchFamily="18" charset="0"/>
+                      </a:rPr>
+                      <m:t>.</m:t>
                     </m:r>
                     <m:r>
                       <a:rPr lang="en-US" sz="2000" b="0" i="1" smtClean="0">
                         <a:latin typeface="Cambria Math" panose="02040503050406030204" pitchFamily="18" charset="0"/>
                         <a:ea typeface="Cambria Math" panose="02040503050406030204" pitchFamily="18" charset="0"/>
                       </a:rPr>
-                      <m:t>66∙70=53</m:t>
+                      <m:t>66</m:t>
+                    </m:r>
+                    <m:r>
+                      <a:rPr lang="en-US" sz="2000" b="0" i="1" smtClean="0">
+                        <a:latin typeface="Cambria Math" panose="02040503050406030204" pitchFamily="18" charset="0"/>
+                        <a:ea typeface="Cambria Math" panose="02040503050406030204" pitchFamily="18" charset="0"/>
+                      </a:rPr>
+                      <m:t>∙</m:t>
+                    </m:r>
+                    <m:r>
+                      <a:rPr lang="en-US" sz="2000" b="0" i="1" smtClean="0">
+                        <a:latin typeface="Cambria Math" panose="02040503050406030204" pitchFamily="18" charset="0"/>
+                        <a:ea typeface="Cambria Math" panose="02040503050406030204" pitchFamily="18" charset="0"/>
+                      </a:rPr>
+                      <m:t>70</m:t>
+                    </m:r>
+                    <m:r>
+                      <a:rPr lang="en-US" sz="2000" b="0" i="1" smtClean="0">
+                        <a:latin typeface="Cambria Math" panose="02040503050406030204" pitchFamily="18" charset="0"/>
+                        <a:ea typeface="Cambria Math" panose="02040503050406030204" pitchFamily="18" charset="0"/>
+                      </a:rPr>
+                      <m:t>=</m:t>
+                    </m:r>
+                    <m:r>
+                      <a:rPr lang="en-US" sz="2000" b="0" i="1" smtClean="0">
+                        <a:latin typeface="Cambria Math" panose="02040503050406030204" pitchFamily="18" charset="0"/>
+                        <a:ea typeface="Cambria Math" panose="02040503050406030204" pitchFamily="18" charset="0"/>
+                      </a:rPr>
+                      <m:t>53</m:t>
                     </m:r>
                   </m:oMath>
                 </a14:m>
-                <a:endParaRPr lang="en-US" sz="2000" dirty="0"/>
+                <a:endParaRPr lang="en-US" sz="2000" dirty="0">
+                  <a:latin typeface="Calibri" panose="020F0502020204030204" pitchFamily="34" charset="0"/>
+                </a:endParaRPr>
               </a:p>
               <a:p>
                 <a:pPr eaLnBrk="1" hangingPunct="1">
@@ -21604,7 +22052,15 @@
                           <a:ea typeface="Cambria Math" panose="02040503050406030204" pitchFamily="18" charset="0"/>
                           <a:cs typeface="Calibri"/>
                         </a:rPr>
-                        <m:t>=53</m:t>
+                        <m:t>=</m:t>
+                      </m:r>
+                      <m:r>
+                        <a:rPr lang="en-US" sz="1800" b="0" i="0" smtClean="0">
+                          <a:latin typeface="Cambria Math" panose="02040503050406030204" pitchFamily="18" charset="0"/>
+                          <a:ea typeface="Cambria Math" panose="02040503050406030204" pitchFamily="18" charset="0"/>
+                          <a:cs typeface="Calibri"/>
+                        </a:rPr>
+                        <m:t>53</m:t>
                       </m:r>
                     </m:oMath>
                   </m:oMathPara>
@@ -21694,7 +22150,7 @@
 </file>
 
 <file path=ppt/slides/slide13.xml><?xml version="1.0" encoding="utf-8"?>
-<p:sld xmlns:a="http://schemas.openxmlformats.org/drawingml/2006/main" xmlns:r="http://schemas.openxmlformats.org/officeDocument/2006/relationships" xmlns:p="http://schemas.openxmlformats.org/presentationml/2006/main" show="0">
+<p:sld xmlns:a="http://schemas.openxmlformats.org/drawingml/2006/main" xmlns:r="http://schemas.openxmlformats.org/officeDocument/2006/relationships" xmlns:p="http://schemas.openxmlformats.org/presentationml/2006/main">
   <p:cSld>
     <p:spTree>
       <p:nvGrpSpPr>
@@ -25393,6 +25849,56 @@
           </a:fontRef>
         </p:style>
       </p:cxnSp>
+      <p:sp>
+        <p:nvSpPr>
+          <p:cNvPr id="10" name="TextBox 9">
+            <a:extLst>
+              <a:ext uri="{FF2B5EF4-FFF2-40B4-BE49-F238E27FC236}">
+                <a16:creationId xmlns:a16="http://schemas.microsoft.com/office/drawing/2014/main" id="{58457C51-6EDC-49B6-FF25-ABC99C1CB5B3}"/>
+              </a:ext>
+            </a:extLst>
+          </p:cNvPr>
+          <p:cNvSpPr txBox="1"/>
+          <p:nvPr/>
+        </p:nvSpPr>
+        <p:spPr>
+          <a:xfrm>
+            <a:off x="5757775" y="5987534"/>
+            <a:ext cx="3305441" cy="369332"/>
+          </a:xfrm>
+          <a:prstGeom prst="rect">
+            <a:avLst/>
+          </a:prstGeom>
+        </p:spPr>
+        <p:style>
+          <a:lnRef idx="2">
+            <a:schemeClr val="accent2">
+              <a:shade val="15000"/>
+            </a:schemeClr>
+          </a:lnRef>
+          <a:fillRef idx="1">
+            <a:schemeClr val="accent2"/>
+          </a:fillRef>
+          <a:effectRef idx="0">
+            <a:schemeClr val="accent2"/>
+          </a:effectRef>
+          <a:fontRef idx="minor">
+            <a:schemeClr val="lt1"/>
+          </a:fontRef>
+        </p:style>
+        <p:txBody>
+          <a:bodyPr wrap="square" rtlCol="0">
+            <a:spAutoFit/>
+          </a:bodyPr>
+          <a:lstStyle/>
+          <a:p>
+            <a:r>
+              <a:rPr lang="en-US" dirty="0"/>
+              <a:t>This is similar to an AND-OR tree!</a:t>
+            </a:r>
+          </a:p>
+        </p:txBody>
+      </p:sp>
     </p:spTree>
   </p:cSld>
   <p:clrMapOvr>
@@ -26291,7 +26797,7 @@
           <a:p>
             <a:r>
               <a:rPr lang="en-US" dirty="0"/>
-              <a:t>Search, planning and playing games we have covered so far are such problems.</a:t>
+              <a:t>Search, planning, and playing games we have covered so far are such problems.</a:t>
             </a:r>
           </a:p>
           <a:p>
@@ -29249,7 +29755,7 @@
               <a:p>
                 <a:r>
                   <a:rPr lang="en-US" sz="1800" dirty="0"/>
-                  <a:t>It is often enough to know a </a:t>
+                  <a:t>It is often enough to know an </a:t>
                 </a:r>
                 <a:r>
                   <a:rPr lang="en-US" sz="1800" b="1" dirty="0"/>
@@ -29350,7 +29856,7 @@
               <a:blipFill>
                 <a:blip r:embed="rId2"/>
                 <a:stretch>
-                  <a:fillRect l="-602" t="-1763" b="-801"/>
+                  <a:fillRect l="-602" t="-1763" r="-120" b="-801"/>
                 </a:stretch>
               </a:blipFill>
             </p:spPr>

</xml_diff>